<commit_message>
D O N E! #LikeABawwwssss V2.0
Removed TODOs, updated README and Presentation.
</commit_message>
<xml_diff>
--- a/Support/CS 5300 Final Presentation May12013.pptx
+++ b/Support/CS 5300 Final Presentation May12013.pptx
@@ -20,6 +20,7 @@
     <p:sldId id="283" r:id="rId14"/>
     <p:sldId id="282" r:id="rId15"/>
     <p:sldId id="271" r:id="rId16"/>
+    <p:sldId id="284" r:id="rId17"/>
   </p:sldIdLst>
   <p:sldSz cx="9144000" cy="6858000" type="screen4x3"/>
   <p:notesSz cx="6858000" cy="9144000"/>
@@ -5428,11 +5429,7 @@
           <a:p>
             <a:r>
               <a:rPr lang="en-US" dirty="0" smtClean="0"/>
-              <a:t>Blocked the nodes using </a:t>
-            </a:r>
-            <a:r>
-              <a:rPr lang="en-US" dirty="0" smtClean="0"/>
-              <a:t>a technique </a:t>
+              <a:t>Blocked the nodes using a technique </a:t>
             </a:r>
             <a:r>
               <a:rPr lang="en-US" dirty="0"/>
@@ -5605,42 +5602,13 @@
             <a:pPr lvl="1"/>
             <a:r>
               <a:rPr lang="en-US" dirty="0" smtClean="0"/>
-              <a:t>It emits more messages this </a:t>
+              <a:t>It emits more messages this time, the list edges within a block, the list of boundary edges and all the nodes within a block.</a:t>
             </a:r>
-            <a:r>
-              <a:rPr lang="en-US" dirty="0" smtClean="0"/>
-              <a:t>time, the list edges within a block, the list of boundary edges </a:t>
-            </a:r>
-            <a:r>
-              <a:rPr lang="en-US" dirty="0" smtClean="0"/>
-              <a:t>and all the nodes within a block.</a:t>
-            </a:r>
-            <a:endParaRPr lang="en-US" dirty="0" smtClean="0"/>
           </a:p>
           <a:p>
             <a:r>
               <a:rPr lang="en-US" dirty="0" smtClean="0"/>
-              <a:t>Reducer: Iterates over the block </a:t>
-            </a:r>
-            <a:r>
-              <a:rPr lang="en-US" dirty="0" smtClean="0"/>
-              <a:t>‘X’(5) </a:t>
-            </a:r>
-            <a:r>
-              <a:rPr lang="en-US" dirty="0" smtClean="0"/>
-              <a:t>times or until convergence, whichever comes </a:t>
-            </a:r>
-            <a:r>
-              <a:rPr lang="en-US" dirty="0" smtClean="0"/>
-              <a:t>first. Then the </a:t>
-            </a:r>
-            <a:r>
-              <a:rPr lang="en-US" dirty="0" smtClean="0"/>
-              <a:t>residual error is </a:t>
-            </a:r>
-            <a:r>
-              <a:rPr lang="en-US" dirty="0" smtClean="0"/>
-              <a:t>calculated by taking the average residual error for all nodes in that block between the starting and ending values of PageRank.</a:t>
+              <a:t>Reducer: Iterates over the block ‘X’(5) times or until convergence, whichever comes first. Then the residual error is calculated by taking the average residual error for all nodes in that block between the starting and ending values of PageRank.</a:t>
             </a:r>
           </a:p>
         </p:txBody>
@@ -5736,7 +5704,6 @@
               <a:rPr lang="en-US" dirty="0" smtClean="0"/>
               <a:t>Residual Errors After 7 Block Level Passes:</a:t>
             </a:r>
-            <a:endParaRPr lang="en-US" dirty="0" smtClean="0"/>
           </a:p>
         </p:txBody>
       </p:sp>
@@ -19334,6 +19301,100 @@
     <p:extLst>
       <p:ext uri="{BB962C8B-B14F-4D97-AF65-F5344CB8AC3E}">
         <p14:creationId xmlns:p14="http://schemas.microsoft.com/office/powerpoint/2010/main" val="2011819"/>
+      </p:ext>
+    </p:extLst>
+  </p:cSld>
+  <p:clrMapOvr>
+    <a:masterClrMapping/>
+  </p:clrMapOvr>
+  <p:timing>
+    <p:tnLst>
+      <p:par>
+        <p:cTn xmlns:p14="http://schemas.microsoft.com/office/powerpoint/2010/main" id="1" dur="indefinite" restart="never" nodeType="tmRoot"/>
+      </p:par>
+    </p:tnLst>
+  </p:timing>
+</p:sld>
+</file>
+
+<file path=ppt/slides/slide16.xml><?xml version="1.0" encoding="utf-8"?>
+<p:sld xmlns:a="http://schemas.openxmlformats.org/drawingml/2006/main" xmlns:r="http://schemas.openxmlformats.org/officeDocument/2006/relationships" xmlns:p="http://schemas.openxmlformats.org/presentationml/2006/main">
+  <p:cSld>
+    <p:spTree>
+      <p:nvGrpSpPr>
+        <p:cNvPr id="1" name=""/>
+        <p:cNvGrpSpPr/>
+        <p:nvPr/>
+      </p:nvGrpSpPr>
+      <p:grpSpPr>
+        <a:xfrm>
+          <a:off x="0" y="0"/>
+          <a:ext cx="0" cy="0"/>
+          <a:chOff x="0" y="0"/>
+          <a:chExt cx="0" cy="0"/>
+        </a:xfrm>
+      </p:grpSpPr>
+      <p:sp>
+        <p:nvSpPr>
+          <p:cNvPr id="2" name="Title 1"/>
+          <p:cNvSpPr>
+            <a:spLocks noGrp="1"/>
+          </p:cNvSpPr>
+          <p:nvPr>
+            <p:ph type="ctrTitle"/>
+          </p:nvPr>
+        </p:nvSpPr>
+        <p:spPr/>
+        <p:txBody>
+          <a:bodyPr/>
+          <a:lstStyle/>
+          <a:p>
+            <a:r>
+              <a:rPr lang="en-US" dirty="0" smtClean="0"/>
+              <a:t>Link To Code</a:t>
+            </a:r>
+            <a:endParaRPr lang="en-US" dirty="0"/>
+          </a:p>
+        </p:txBody>
+      </p:sp>
+      <p:sp>
+        <p:nvSpPr>
+          <p:cNvPr id="3" name="Subtitle 2"/>
+          <p:cNvSpPr>
+            <a:spLocks noGrp="1"/>
+          </p:cNvSpPr>
+          <p:nvPr>
+            <p:ph type="subTitle" idx="1"/>
+          </p:nvPr>
+        </p:nvSpPr>
+        <p:spPr/>
+        <p:txBody>
+          <a:bodyPr/>
+          <a:lstStyle/>
+          <a:p>
+            <a:r>
+              <a:rPr lang="en-US" dirty="0">
+                <a:hlinkClick r:id="rId2"/>
+              </a:rPr>
+              <a:t>https://github.com/MatthewGreen/CS5300-</a:t>
+            </a:r>
+            <a:r>
+              <a:rPr lang="en-US" dirty="0" smtClean="0">
+                <a:hlinkClick r:id="rId2"/>
+              </a:rPr>
+              <a:t>Project2</a:t>
+            </a:r>
+            <a:endParaRPr lang="en-US" dirty="0" smtClean="0"/>
+          </a:p>
+          <a:p>
+            <a:endParaRPr lang="en-US" dirty="0" smtClean="0"/>
+          </a:p>
+        </p:txBody>
+      </p:sp>
+    </p:spTree>
+    <p:extLst>
+      <p:ext uri="{BB962C8B-B14F-4D97-AF65-F5344CB8AC3E}">
+        <p14:creationId xmlns:p14="http://schemas.microsoft.com/office/powerpoint/2010/main" val="1838611066"/>
       </p:ext>
     </p:extLst>
   </p:cSld>
@@ -21642,15 +21703,7 @@
                   <a:srgbClr val="FF0000"/>
                 </a:solidFill>
               </a:rPr>
-              <a:t>0.0339</a:t>
-            </a:r>
-            <a:r>
-              <a:rPr lang="en-US" sz="3600" b="1" dirty="0" smtClean="0">
-                <a:solidFill>
-                  <a:srgbClr val="FF0000"/>
-                </a:solidFill>
-              </a:rPr>
-              <a:t>.</a:t>
+              <a:t>0.0339.</a:t>
             </a:r>
             <a:endParaRPr lang="en-US" dirty="0"/>
           </a:p>

</xml_diff>